<commit_message>
slides update for L1
</commit_message>
<xml_diff>
--- a/docs/slides/01-intro.pptx
+++ b/docs/slides/01-intro.pptx
@@ -5,7 +5,7 @@
     <p:sldMasterId id="2147483648" r:id="rId1"/>
   </p:sldMasterIdLst>
   <p:notesMasterIdLst>
-    <p:notesMasterId r:id="rId22"/>
+    <p:notesMasterId r:id="rId21"/>
   </p:notesMasterIdLst>
   <p:sldIdLst>
     <p:sldId id="256" r:id="rId2"/>
@@ -20,14 +20,13 @@
     <p:sldId id="428" r:id="rId11"/>
     <p:sldId id="429" r:id="rId12"/>
     <p:sldId id="430" r:id="rId13"/>
-    <p:sldId id="262" r:id="rId14"/>
-    <p:sldId id="432" r:id="rId15"/>
-    <p:sldId id="435" r:id="rId16"/>
-    <p:sldId id="433" r:id="rId17"/>
-    <p:sldId id="438" r:id="rId18"/>
-    <p:sldId id="439" r:id="rId19"/>
-    <p:sldId id="437" r:id="rId20"/>
-    <p:sldId id="440" r:id="rId21"/>
+    <p:sldId id="432" r:id="rId14"/>
+    <p:sldId id="435" r:id="rId15"/>
+    <p:sldId id="433" r:id="rId16"/>
+    <p:sldId id="438" r:id="rId17"/>
+    <p:sldId id="439" r:id="rId18"/>
+    <p:sldId id="437" r:id="rId19"/>
+    <p:sldId id="440" r:id="rId20"/>
   </p:sldIdLst>
   <p:sldSz cx="12192000" cy="6858000"/>
   <p:notesSz cx="6858000" cy="9144000"/>
@@ -216,7 +215,7 @@
           <a:p>
             <a:fld id="{26C23BA1-C1FD-F54C-A91D-365911BB70A0}" type="datetimeFigureOut">
               <a:rPr lang="en-US" smtClean="0"/>
-              <a:t>12/13/24</a:t>
+              <a:t>9/29/25</a:t>
             </a:fld>
             <a:endParaRPr lang="en-US"/>
           </a:p>
@@ -1187,90 +1186,6 @@
 </p:notes>
 </file>
 
-<file path=ppt/notesSlides/notesSlide3.xml><?xml version="1.0" encoding="utf-8"?>
-<p:notes xmlns:a="http://schemas.openxmlformats.org/drawingml/2006/main" xmlns:r="http://schemas.openxmlformats.org/officeDocument/2006/relationships" xmlns:p="http://schemas.openxmlformats.org/presentationml/2006/main">
-  <p:cSld>
-    <p:spTree>
-      <p:nvGrpSpPr>
-        <p:cNvPr id="1" name=""/>
-        <p:cNvGrpSpPr/>
-        <p:nvPr/>
-      </p:nvGrpSpPr>
-      <p:grpSpPr>
-        <a:xfrm>
-          <a:off x="0" y="0"/>
-          <a:ext cx="0" cy="0"/>
-          <a:chOff x="0" y="0"/>
-          <a:chExt cx="0" cy="0"/>
-        </a:xfrm>
-      </p:grpSpPr>
-      <p:sp>
-        <p:nvSpPr>
-          <p:cNvPr id="2" name="Slide Image Placeholder 1"/>
-          <p:cNvSpPr>
-            <a:spLocks noGrp="1" noRot="1" noChangeAspect="1"/>
-          </p:cNvSpPr>
-          <p:nvPr>
-            <p:ph type="sldImg"/>
-          </p:nvPr>
-        </p:nvSpPr>
-        <p:spPr/>
-      </p:sp>
-      <p:sp>
-        <p:nvSpPr>
-          <p:cNvPr id="3" name="Notes Placeholder 2"/>
-          <p:cNvSpPr>
-            <a:spLocks noGrp="1"/>
-          </p:cNvSpPr>
-          <p:nvPr>
-            <p:ph type="body" idx="1"/>
-          </p:nvPr>
-        </p:nvSpPr>
-        <p:spPr/>
-        <p:txBody>
-          <a:bodyPr/>
-          <a:lstStyle/>
-          <a:p>
-            <a:endParaRPr lang="en-US"/>
-          </a:p>
-        </p:txBody>
-      </p:sp>
-      <p:sp>
-        <p:nvSpPr>
-          <p:cNvPr id="4" name="Slide Number Placeholder 3"/>
-          <p:cNvSpPr>
-            <a:spLocks noGrp="1"/>
-          </p:cNvSpPr>
-          <p:nvPr>
-            <p:ph type="sldNum" sz="quarter" idx="5"/>
-          </p:nvPr>
-        </p:nvSpPr>
-        <p:spPr/>
-        <p:txBody>
-          <a:bodyPr/>
-          <a:lstStyle/>
-          <a:p>
-            <a:fld id="{F3EDB452-00BF-924C-9465-03C1104CE954}" type="slidenum">
-              <a:rPr lang="en-US" smtClean="0"/>
-              <a:t>13</a:t>
-            </a:fld>
-            <a:endParaRPr lang="en-US"/>
-          </a:p>
-        </p:txBody>
-      </p:sp>
-    </p:spTree>
-    <p:extLst>
-      <p:ext uri="{BB962C8B-B14F-4D97-AF65-F5344CB8AC3E}">
-        <p14:creationId xmlns:p14="http://schemas.microsoft.com/office/powerpoint/2010/main" val="2157542374"/>
-      </p:ext>
-    </p:extLst>
-  </p:cSld>
-  <p:clrMapOvr>
-    <a:masterClrMapping/>
-  </p:clrMapOvr>
-</p:notes>
-</file>
-
 <file path=ppt/slideLayouts/slideLayout1.xml><?xml version="1.0" encoding="utf-8"?>
 <p:sldLayout xmlns:a="http://schemas.openxmlformats.org/drawingml/2006/main" xmlns:r="http://schemas.openxmlformats.org/officeDocument/2006/relationships" xmlns:p="http://schemas.openxmlformats.org/presentationml/2006/main" type="title" preserve="1">
   <p:cSld name="Title Slide">
@@ -1418,7 +1333,7 @@
           <a:p>
             <a:fld id="{6E174B13-2F4C-954D-BC49-D8D95C50C36E}" type="datetimeFigureOut">
               <a:rPr lang="en-US" smtClean="0"/>
-              <a:t>12/13/24</a:t>
+              <a:t>9/29/25</a:t>
             </a:fld>
             <a:endParaRPr lang="en-US"/>
           </a:p>
@@ -1616,7 +1531,7 @@
           <a:p>
             <a:fld id="{6E174B13-2F4C-954D-BC49-D8D95C50C36E}" type="datetimeFigureOut">
               <a:rPr lang="en-US" smtClean="0"/>
-              <a:t>12/13/24</a:t>
+              <a:t>9/29/25</a:t>
             </a:fld>
             <a:endParaRPr lang="en-US"/>
           </a:p>
@@ -1824,7 +1739,7 @@
           <a:p>
             <a:fld id="{6E174B13-2F4C-954D-BC49-D8D95C50C36E}" type="datetimeFigureOut">
               <a:rPr lang="en-US" smtClean="0"/>
-              <a:t>12/13/24</a:t>
+              <a:t>9/29/25</a:t>
             </a:fld>
             <a:endParaRPr lang="en-US"/>
           </a:p>
@@ -2022,7 +1937,7 @@
           <a:p>
             <a:fld id="{6E174B13-2F4C-954D-BC49-D8D95C50C36E}" type="datetimeFigureOut">
               <a:rPr lang="en-US" smtClean="0"/>
-              <a:t>12/13/24</a:t>
+              <a:t>9/29/25</a:t>
             </a:fld>
             <a:endParaRPr lang="en-US"/>
           </a:p>
@@ -2297,7 +2212,7 @@
           <a:p>
             <a:fld id="{6E174B13-2F4C-954D-BC49-D8D95C50C36E}" type="datetimeFigureOut">
               <a:rPr lang="en-US" smtClean="0"/>
-              <a:t>12/13/24</a:t>
+              <a:t>9/29/25</a:t>
             </a:fld>
             <a:endParaRPr lang="en-US"/>
           </a:p>
@@ -2562,7 +2477,7 @@
           <a:p>
             <a:fld id="{6E174B13-2F4C-954D-BC49-D8D95C50C36E}" type="datetimeFigureOut">
               <a:rPr lang="en-US" smtClean="0"/>
-              <a:t>12/13/24</a:t>
+              <a:t>9/29/25</a:t>
             </a:fld>
             <a:endParaRPr lang="en-US"/>
           </a:p>
@@ -2974,7 +2889,7 @@
           <a:p>
             <a:fld id="{6E174B13-2F4C-954D-BC49-D8D95C50C36E}" type="datetimeFigureOut">
               <a:rPr lang="en-US" smtClean="0"/>
-              <a:t>12/13/24</a:t>
+              <a:t>9/29/25</a:t>
             </a:fld>
             <a:endParaRPr lang="en-US"/>
           </a:p>
@@ -3115,7 +3030,7 @@
           <a:p>
             <a:fld id="{6E174B13-2F4C-954D-BC49-D8D95C50C36E}" type="datetimeFigureOut">
               <a:rPr lang="en-US" smtClean="0"/>
-              <a:t>12/13/24</a:t>
+              <a:t>9/29/25</a:t>
             </a:fld>
             <a:endParaRPr lang="en-US"/>
           </a:p>
@@ -3228,7 +3143,7 @@
           <a:p>
             <a:fld id="{6E174B13-2F4C-954D-BC49-D8D95C50C36E}" type="datetimeFigureOut">
               <a:rPr lang="en-US" smtClean="0"/>
-              <a:t>12/13/24</a:t>
+              <a:t>9/29/25</a:t>
             </a:fld>
             <a:endParaRPr lang="en-US"/>
           </a:p>
@@ -3539,7 +3454,7 @@
           <a:p>
             <a:fld id="{6E174B13-2F4C-954D-BC49-D8D95C50C36E}" type="datetimeFigureOut">
               <a:rPr lang="en-US" smtClean="0"/>
-              <a:t>12/13/24</a:t>
+              <a:t>9/29/25</a:t>
             </a:fld>
             <a:endParaRPr lang="en-US"/>
           </a:p>
@@ -3827,7 +3742,7 @@
           <a:p>
             <a:fld id="{6E174B13-2F4C-954D-BC49-D8D95C50C36E}" type="datetimeFigureOut">
               <a:rPr lang="en-US" smtClean="0"/>
-              <a:t>12/13/24</a:t>
+              <a:t>9/29/25</a:t>
             </a:fld>
             <a:endParaRPr lang="en-US"/>
           </a:p>
@@ -4068,7 +3983,7 @@
           <a:p>
             <a:fld id="{6E174B13-2F4C-954D-BC49-D8D95C50C36E}" type="datetimeFigureOut">
               <a:rPr lang="en-US" smtClean="0"/>
-              <a:t>12/13/24</a:t>
+              <a:t>9/29/25</a:t>
             </a:fld>
             <a:endParaRPr lang="en-US"/>
           </a:p>
@@ -5267,7 +5182,7 @@
           <p:cNvPr id="2" name="Title 1">
             <a:extLst>
               <a:ext uri="{FF2B5EF4-FFF2-40B4-BE49-F238E27FC236}">
-                <a16:creationId xmlns:a16="http://schemas.microsoft.com/office/drawing/2014/main" id="{2C144DD8-72E4-924E-B209-4F76DF36BDBE}"/>
+                <a16:creationId xmlns:a16="http://schemas.microsoft.com/office/drawing/2014/main" id="{ED9DE1A5-BEC4-F049-BD3A-F5EAC3F03156}"/>
               </a:ext>
             </a:extLst>
           </p:cNvPr>
@@ -5285,83 +5200,15 @@
           <a:p>
             <a:r>
               <a:rPr lang="en-US" dirty="0"/>
-              <a:t>For Next Class: </a:t>
-            </a:r>
-            <a:r>
-              <a:rPr lang="en-US" dirty="0" err="1"/>
-              <a:t>Jupyter</a:t>
-            </a:r>
-            <a:r>
-              <a:rPr lang="en-US" dirty="0"/>
-              <a:t> Notebook Installation</a:t>
-            </a:r>
-          </a:p>
-        </p:txBody>
-      </p:sp>
-      <p:pic>
-        <p:nvPicPr>
-          <p:cNvPr id="5" name="Picture 4">
-            <a:extLst>
-              <a:ext uri="{FF2B5EF4-FFF2-40B4-BE49-F238E27FC236}">
-                <a16:creationId xmlns:a16="http://schemas.microsoft.com/office/drawing/2014/main" id="{2D776F70-49D5-F147-9C17-E3CE9107A65B}"/>
-              </a:ext>
-            </a:extLst>
-          </p:cNvPr>
-          <p:cNvPicPr>
-            <a:picLocks noChangeAspect="1"/>
-          </p:cNvPicPr>
-          <p:nvPr/>
-        </p:nvPicPr>
-        <p:blipFill>
-          <a:blip r:embed="rId3"/>
-          <a:stretch>
-            <a:fillRect/>
-          </a:stretch>
-        </p:blipFill>
-        <p:spPr>
-          <a:xfrm>
-            <a:off x="4003287" y="4607630"/>
-            <a:ext cx="7961971" cy="2250370"/>
-          </a:xfrm>
-          <a:prstGeom prst="rect">
-            <a:avLst/>
-          </a:prstGeom>
-        </p:spPr>
-      </p:pic>
-      <p:pic>
-        <p:nvPicPr>
-          <p:cNvPr id="3" name="Picture 2">
-            <a:extLst>
-              <a:ext uri="{FF2B5EF4-FFF2-40B4-BE49-F238E27FC236}">
-                <a16:creationId xmlns:a16="http://schemas.microsoft.com/office/drawing/2014/main" id="{CB64F071-EB8B-8345-A859-36E3072191F8}"/>
-              </a:ext>
-            </a:extLst>
-          </p:cNvPr>
-          <p:cNvPicPr>
-            <a:picLocks noChangeAspect="1"/>
-          </p:cNvPicPr>
-          <p:nvPr/>
-        </p:nvPicPr>
-        <p:blipFill>
-          <a:blip r:embed="rId4"/>
-          <a:stretch>
-            <a:fillRect/>
-          </a:stretch>
-        </p:blipFill>
-        <p:spPr>
-          <a:xfrm>
-            <a:off x="838200" y="1832653"/>
-            <a:ext cx="5897949" cy="2604106"/>
-          </a:xfrm>
-          <a:prstGeom prst="rect">
-            <a:avLst/>
-          </a:prstGeom>
-        </p:spPr>
-      </p:pic>
+              <a:t>Structure and Syllabus</a:t>
+            </a:r>
+          </a:p>
+        </p:txBody>
+      </p:sp>
     </p:spTree>
     <p:extLst>
       <p:ext uri="{BB962C8B-B14F-4D97-AF65-F5344CB8AC3E}">
-        <p14:creationId xmlns:p14="http://schemas.microsoft.com/office/powerpoint/2010/main" val="481173448"/>
+        <p14:creationId xmlns:p14="http://schemas.microsoft.com/office/powerpoint/2010/main" val="1521776816"/>
       </p:ext>
     </p:extLst>
   </p:cSld>
@@ -5393,7 +5240,7 @@
           <p:cNvPr id="2" name="Title 1">
             <a:extLst>
               <a:ext uri="{FF2B5EF4-FFF2-40B4-BE49-F238E27FC236}">
-                <a16:creationId xmlns:a16="http://schemas.microsoft.com/office/drawing/2014/main" id="{ED9DE1A5-BEC4-F049-BD3A-F5EAC3F03156}"/>
+                <a16:creationId xmlns:a16="http://schemas.microsoft.com/office/drawing/2014/main" id="{35B7AB71-B2C1-1E41-A94C-716C8CDB6FEE}"/>
               </a:ext>
             </a:extLst>
           </p:cNvPr>
@@ -5411,47 +5258,17 @@
           <a:p>
             <a:r>
               <a:rPr lang="en-US" dirty="0"/>
-              <a:t>Structure and Syllabus</a:t>
-            </a:r>
-          </a:p>
-        </p:txBody>
-      </p:sp>
-      <p:pic>
-        <p:nvPicPr>
-          <p:cNvPr id="4" name="Picture 3">
-            <a:extLst>
-              <a:ext uri="{FF2B5EF4-FFF2-40B4-BE49-F238E27FC236}">
-                <a16:creationId xmlns:a16="http://schemas.microsoft.com/office/drawing/2014/main" id="{CBF77C4F-F6AB-8642-9062-4566063A9750}"/>
-              </a:ext>
-            </a:extLst>
-          </p:cNvPr>
-          <p:cNvPicPr>
-            <a:picLocks noChangeAspect="1"/>
-          </p:cNvPicPr>
-          <p:nvPr/>
-        </p:nvPicPr>
-        <p:blipFill>
-          <a:blip r:embed="rId2"/>
-          <a:stretch>
-            <a:fillRect/>
-          </a:stretch>
-        </p:blipFill>
-        <p:spPr>
-          <a:xfrm>
-            <a:off x="6096000" y="0"/>
-            <a:ext cx="5935399" cy="6858000"/>
-          </a:xfrm>
-          <a:prstGeom prst="rect">
-            <a:avLst/>
-          </a:prstGeom>
-        </p:spPr>
-      </p:pic>
-      <p:sp>
-        <p:nvSpPr>
-          <p:cNvPr id="8" name="Content Placeholder 7">
-            <a:extLst>
-              <a:ext uri="{FF2B5EF4-FFF2-40B4-BE49-F238E27FC236}">
-                <a16:creationId xmlns:a16="http://schemas.microsoft.com/office/drawing/2014/main" id="{278E06FB-6785-AD45-8139-1F6B409F6E22}"/>
+              <a:t>Readings</a:t>
+            </a:r>
+          </a:p>
+        </p:txBody>
+      </p:sp>
+      <p:sp>
+        <p:nvSpPr>
+          <p:cNvPr id="4" name="Content Placeholder 5">
+            <a:extLst>
+              <a:ext uri="{FF2B5EF4-FFF2-40B4-BE49-F238E27FC236}">
+                <a16:creationId xmlns:a16="http://schemas.microsoft.com/office/drawing/2014/main" id="{3A37193A-5640-A04A-9222-D6D8C190AEF2}"/>
               </a:ext>
             </a:extLst>
           </p:cNvPr>
@@ -5462,24 +5279,57 @@
             <p:ph idx="1"/>
           </p:nvPr>
         </p:nvSpPr>
-        <p:spPr>
-          <a:xfrm>
-            <a:off x="838200" y="1825625"/>
-            <a:ext cx="4447478" cy="4351338"/>
-          </a:xfrm>
-        </p:spPr>
+        <p:spPr/>
         <p:txBody>
           <a:bodyPr/>
           <a:lstStyle/>
           <a:p>
+            <a:r>
+              <a:rPr lang="en-US" dirty="0"/>
+              <a:t>There will be reading for most classes.</a:t>
+            </a:r>
+          </a:p>
+          <a:p>
+            <a:r>
+              <a:rPr lang="en-US" dirty="0"/>
+              <a:t>There is a textbook in progress. You have a link to it from the webpage. Later chapters (as you can see) are not yet complete, but will be taking shape was we go.</a:t>
+            </a:r>
+          </a:p>
+          <a:p>
+            <a:r>
+              <a:rPr lang="en-US" dirty="0"/>
+              <a:t>There will be other readings as appropriate.</a:t>
+            </a:r>
+          </a:p>
+          <a:p>
             <a:endParaRPr lang="en-US" dirty="0"/>
+          </a:p>
+          <a:p>
+            <a:r>
+              <a:rPr lang="en-US" b="1" dirty="0"/>
+              <a:t>Read before class. </a:t>
+            </a:r>
+            <a:br>
+              <a:rPr lang="en-US" b="1" dirty="0"/>
+            </a:br>
+            <a:r>
+              <a:rPr lang="en-US" dirty="0"/>
+              <a:t>(I am preparing…class will go better if we are all prepared.)</a:t>
+            </a:r>
+          </a:p>
+          <a:p>
+            <a:pPr lvl="1"/>
+            <a:r>
+              <a:rPr lang="en-US" b="1" dirty="0"/>
+              <a:t>I will ask you to bring one question about the reading to each class.</a:t>
+            </a:r>
           </a:p>
         </p:txBody>
       </p:sp>
     </p:spTree>
     <p:extLst>
       <p:ext uri="{BB962C8B-B14F-4D97-AF65-F5344CB8AC3E}">
-        <p14:creationId xmlns:p14="http://schemas.microsoft.com/office/powerpoint/2010/main" val="1521776816"/>
+        <p14:creationId xmlns:p14="http://schemas.microsoft.com/office/powerpoint/2010/main" val="3199192595"/>
       </p:ext>
     </p:extLst>
   </p:cSld>
@@ -5511,7 +5361,7 @@
           <p:cNvPr id="2" name="Title 1">
             <a:extLst>
               <a:ext uri="{FF2B5EF4-FFF2-40B4-BE49-F238E27FC236}">
-                <a16:creationId xmlns:a16="http://schemas.microsoft.com/office/drawing/2014/main" id="{35B7AB71-B2C1-1E41-A94C-716C8CDB6FEE}"/>
+                <a16:creationId xmlns:a16="http://schemas.microsoft.com/office/drawing/2014/main" id="{272F7714-D549-AA49-9FB5-A221B2F22869}"/>
               </a:ext>
             </a:extLst>
           </p:cNvPr>
@@ -5529,17 +5379,17 @@
           <a:p>
             <a:r>
               <a:rPr lang="en-US" dirty="0"/>
-              <a:t>Readings</a:t>
-            </a:r>
-          </a:p>
-        </p:txBody>
-      </p:sp>
-      <p:sp>
-        <p:nvSpPr>
-          <p:cNvPr id="4" name="Content Placeholder 5">
-            <a:extLst>
-              <a:ext uri="{FF2B5EF4-FFF2-40B4-BE49-F238E27FC236}">
-                <a16:creationId xmlns:a16="http://schemas.microsoft.com/office/drawing/2014/main" id="{3A37193A-5640-A04A-9222-D6D8C190AEF2}"/>
+              <a:t>Communication and Collaboration</a:t>
+            </a:r>
+          </a:p>
+        </p:txBody>
+      </p:sp>
+      <p:sp>
+        <p:nvSpPr>
+          <p:cNvPr id="4" name="Content Placeholder 2">
+            <a:extLst>
+              <a:ext uri="{FF2B5EF4-FFF2-40B4-BE49-F238E27FC236}">
+                <a16:creationId xmlns:a16="http://schemas.microsoft.com/office/drawing/2014/main" id="{F39F2D27-D31C-4940-B5D4-FBCF5D319A5E}"/>
               </a:ext>
             </a:extLst>
           </p:cNvPr>
@@ -5552,55 +5402,114 @@
         </p:nvSpPr>
         <p:spPr/>
         <p:txBody>
-          <a:bodyPr/>
+          <a:bodyPr>
+            <a:normAutofit fontScale="92500" lnSpcReduction="20000"/>
+          </a:bodyPr>
           <a:lstStyle/>
           <a:p>
             <a:r>
               <a:rPr lang="en-US" dirty="0"/>
-              <a:t>There will be reading for most classes.</a:t>
-            </a:r>
-          </a:p>
-          <a:p>
+              <a:t>Channels</a:t>
+            </a:r>
+          </a:p>
+          <a:p>
+            <a:pPr lvl="1"/>
             <a:r>
               <a:rPr lang="en-US" dirty="0"/>
-              <a:t>There is a textbook in progress. You have a link to it from the webpage. Later chapters (as you can see) are not yet complete, but will be taking shape was we go.</a:t>
-            </a:r>
-          </a:p>
-          <a:p>
+              <a:t>Q&amp;A/Communication via Slack</a:t>
+            </a:r>
+          </a:p>
+          <a:p>
+            <a:pPr lvl="1"/>
             <a:r>
               <a:rPr lang="en-US" dirty="0"/>
-              <a:t>There will be other readings as appropriate.</a:t>
-            </a:r>
-          </a:p>
-          <a:p>
+              <a:t>Announcements via Canvas/Slack</a:t>
+            </a:r>
+          </a:p>
+          <a:p>
+            <a:pPr lvl="1"/>
+            <a:r>
+              <a:rPr lang="en-US" dirty="0"/>
+              <a:t>Assignments via Canvas/</a:t>
+            </a:r>
+            <a:r>
+              <a:rPr lang="en-US" dirty="0" err="1"/>
+              <a:t>Gradescope</a:t>
+            </a:r>
             <a:endParaRPr lang="en-US" dirty="0"/>
           </a:p>
           <a:p>
+            <a:pPr lvl="1"/>
+            <a:endParaRPr lang="en-US" dirty="0"/>
+          </a:p>
+          <a:p>
             <a:r>
               <a:rPr lang="en-US" b="1" dirty="0"/>
-              <a:t>Read before class. </a:t>
+              <a:t>You are welcome and encouraged to work together. </a:t>
             </a:r>
             <a:br>
               <a:rPr lang="en-US" b="1" dirty="0"/>
             </a:br>
             <a:r>
               <a:rPr lang="en-US" dirty="0"/>
-              <a:t>(I am preparing…class will go better if we are all prepared.)</a:t>
+              <a:t>(on everything but the midterm and final)</a:t>
             </a:r>
           </a:p>
           <a:p>
             <a:pPr lvl="1"/>
             <a:r>
-              <a:rPr lang="en-US" b="1" dirty="0"/>
-              <a:t>I will ask you to bring one question about the reading to each class.</a:t>
-            </a:r>
+              <a:rPr lang="en-US" dirty="0"/>
+              <a:t>There are more of you than there are of me!</a:t>
+            </a:r>
+          </a:p>
+          <a:p>
+            <a:pPr lvl="1"/>
+            <a:r>
+              <a:rPr lang="en-US" dirty="0"/>
+              <a:t>Please acknowledge your collaborators, </a:t>
+            </a:r>
+            <a:r>
+              <a:rPr lang="en-US" i="1" dirty="0"/>
+              <a:t>specifically</a:t>
+            </a:r>
+          </a:p>
+          <a:p>
+            <a:pPr lvl="1"/>
+            <a:r>
+              <a:rPr lang="en-US" dirty="0"/>
+              <a:t>Participation credit for helping others</a:t>
+            </a:r>
+          </a:p>
+          <a:p>
+            <a:pPr lvl="1"/>
+            <a:endParaRPr lang="en-US" dirty="0"/>
+          </a:p>
+          <a:p>
+            <a:r>
+              <a:rPr lang="en-US" dirty="0"/>
+              <a:t>Before posting a question… (1) try; (2) think.  </a:t>
+            </a:r>
+            <a:br>
+              <a:rPr lang="en-US" dirty="0"/>
+            </a:br>
+            <a:r>
+              <a:rPr lang="en-US" dirty="0"/>
+              <a:t>We will ask you what you’ve tried.</a:t>
+            </a:r>
+          </a:p>
+          <a:p>
+            <a:pPr lvl="1"/>
+            <a:endParaRPr lang="en-US" dirty="0"/>
+          </a:p>
+          <a:p>
+            <a:endParaRPr lang="en-US" dirty="0"/>
           </a:p>
         </p:txBody>
       </p:sp>
     </p:spTree>
     <p:extLst>
       <p:ext uri="{BB962C8B-B14F-4D97-AF65-F5344CB8AC3E}">
-        <p14:creationId xmlns:p14="http://schemas.microsoft.com/office/powerpoint/2010/main" val="3199192595"/>
+        <p14:creationId xmlns:p14="http://schemas.microsoft.com/office/powerpoint/2010/main" val="3420115950"/>
       </p:ext>
     </p:extLst>
   </p:cSld>
@@ -5632,7 +5541,7 @@
           <p:cNvPr id="2" name="Title 1">
             <a:extLst>
               <a:ext uri="{FF2B5EF4-FFF2-40B4-BE49-F238E27FC236}">
-                <a16:creationId xmlns:a16="http://schemas.microsoft.com/office/drawing/2014/main" id="{272F7714-D549-AA49-9FB5-A221B2F22869}"/>
+                <a16:creationId xmlns:a16="http://schemas.microsoft.com/office/drawing/2014/main" id="{F3C541B5-22D2-5A42-B7B5-FDF3FC3C139A}"/>
               </a:ext>
             </a:extLst>
           </p:cNvPr>
@@ -5650,17 +5559,17 @@
           <a:p>
             <a:r>
               <a:rPr lang="en-US" dirty="0"/>
-              <a:t>Communication and Collaboration</a:t>
-            </a:r>
-          </a:p>
-        </p:txBody>
-      </p:sp>
-      <p:sp>
-        <p:nvSpPr>
-          <p:cNvPr id="4" name="Content Placeholder 2">
-            <a:extLst>
-              <a:ext uri="{FF2B5EF4-FFF2-40B4-BE49-F238E27FC236}">
-                <a16:creationId xmlns:a16="http://schemas.microsoft.com/office/drawing/2014/main" id="{F39F2D27-D31C-4940-B5D4-FBCF5D319A5E}"/>
+              <a:t>Assignments</a:t>
+            </a:r>
+          </a:p>
+        </p:txBody>
+      </p:sp>
+      <p:sp>
+        <p:nvSpPr>
+          <p:cNvPr id="3" name="Content Placeholder 2">
+            <a:extLst>
+              <a:ext uri="{FF2B5EF4-FFF2-40B4-BE49-F238E27FC236}">
+                <a16:creationId xmlns:a16="http://schemas.microsoft.com/office/drawing/2014/main" id="{DDB5F382-45E9-AB48-89C6-F2CE37D774F4}"/>
               </a:ext>
             </a:extLst>
           </p:cNvPr>
@@ -5668,119 +5577,132 @@
             <a:spLocks noGrp="1"/>
           </p:cNvSpPr>
           <p:nvPr>
-            <p:ph idx="1"/>
+            <p:ph sz="half" idx="1"/>
           </p:nvPr>
         </p:nvSpPr>
         <p:spPr/>
         <p:txBody>
-          <a:bodyPr>
-            <a:normAutofit fontScale="92500" lnSpcReduction="20000"/>
-          </a:bodyPr>
+          <a:bodyPr/>
           <a:lstStyle/>
           <a:p>
             <a:r>
               <a:rPr lang="en-US" dirty="0"/>
-              <a:t>Channels</a:t>
-            </a:r>
-          </a:p>
-          <a:p>
-            <a:pPr lvl="1"/>
+              <a:t>Out on Fridays, due on Fridays.</a:t>
+            </a:r>
+          </a:p>
+          <a:p>
+            <a:endParaRPr lang="en-US" dirty="0"/>
+          </a:p>
+          <a:p>
             <a:r>
               <a:rPr lang="en-US" dirty="0"/>
-              <a:t>Q&amp;A/Communication via Slack</a:t>
-            </a:r>
-          </a:p>
-          <a:p>
-            <a:pPr lvl="1"/>
-            <a:r>
-              <a:rPr lang="en-US" dirty="0"/>
-              <a:t>Announcements via Canvas/Slack</a:t>
-            </a:r>
-          </a:p>
-          <a:p>
-            <a:pPr lvl="1"/>
-            <a:r>
-              <a:rPr lang="en-US" dirty="0"/>
-              <a:t>Assignments via Canvas/</a:t>
-            </a:r>
-            <a:r>
-              <a:rPr lang="en-US" dirty="0" err="1"/>
-              <a:t>Gradescope</a:t>
-            </a:r>
-            <a:endParaRPr lang="en-US" dirty="0"/>
-          </a:p>
-          <a:p>
-            <a:pPr lvl="1"/>
-            <a:endParaRPr lang="en-US" dirty="0"/>
-          </a:p>
-          <a:p>
-            <a:r>
-              <a:rPr lang="en-US" b="1" dirty="0"/>
-              <a:t>You are welcome and encouraged to work together. </a:t>
-            </a:r>
-            <a:br>
-              <a:rPr lang="en-US" b="1" dirty="0"/>
-            </a:br>
-            <a:r>
-              <a:rPr lang="en-US" dirty="0"/>
-              <a:t>(on everything but the midterm and final)</a:t>
-            </a:r>
-          </a:p>
-          <a:p>
-            <a:pPr lvl="1"/>
-            <a:r>
-              <a:rPr lang="en-US" dirty="0"/>
-              <a:t>There are more of you than there are of me!</a:t>
-            </a:r>
-          </a:p>
-          <a:p>
-            <a:pPr lvl="1"/>
-            <a:r>
-              <a:rPr lang="en-US" dirty="0"/>
-              <a:t>Please acknowledge your collaborators, </a:t>
-            </a:r>
-            <a:r>
-              <a:rPr lang="en-US" i="1" dirty="0"/>
-              <a:t>specifically</a:t>
-            </a:r>
-          </a:p>
-          <a:p>
-            <a:pPr lvl="1"/>
-            <a:r>
-              <a:rPr lang="en-US" dirty="0"/>
-              <a:t>Participation credit for helping others</a:t>
-            </a:r>
-          </a:p>
-          <a:p>
-            <a:pPr lvl="1"/>
-            <a:endParaRPr lang="en-US" dirty="0"/>
-          </a:p>
-          <a:p>
-            <a:r>
-              <a:rPr lang="en-US" dirty="0"/>
-              <a:t>Before posting a question… (1) try; (2) think.  </a:t>
+              <a:t>Approximately every two weeks. </a:t>
             </a:r>
             <a:br>
               <a:rPr lang="en-US" dirty="0"/>
             </a:br>
             <a:r>
               <a:rPr lang="en-US" dirty="0"/>
-              <a:t>We will ask you what you’ve tried.</a:t>
+              <a:t>We will also have a warm-up assignment to test the workflow.</a:t>
+            </a:r>
+          </a:p>
+          <a:p>
+            <a:endParaRPr lang="en-US" dirty="0"/>
+          </a:p>
+          <a:p>
+            <a:r>
+              <a:rPr lang="en-US" dirty="0"/>
+              <a:t>Predictable cadence to help you plan.</a:t>
+            </a:r>
+          </a:p>
+        </p:txBody>
+      </p:sp>
+      <p:sp>
+        <p:nvSpPr>
+          <p:cNvPr id="4" name="Content Placeholder 3">
+            <a:extLst>
+              <a:ext uri="{FF2B5EF4-FFF2-40B4-BE49-F238E27FC236}">
+                <a16:creationId xmlns:a16="http://schemas.microsoft.com/office/drawing/2014/main" id="{32C5AB2B-5BF3-F54D-9029-203BD674A93C}"/>
+              </a:ext>
+            </a:extLst>
+          </p:cNvPr>
+          <p:cNvSpPr>
+            <a:spLocks noGrp="1"/>
+          </p:cNvSpPr>
+          <p:nvPr>
+            <p:ph sz="half" idx="2"/>
+          </p:nvPr>
+        </p:nvSpPr>
+        <p:spPr/>
+        <p:txBody>
+          <a:bodyPr/>
+          <a:lstStyle/>
+          <a:p>
+            <a:r>
+              <a:rPr lang="en-US" dirty="0"/>
+              <a:t>4–5 Assignments</a:t>
+            </a:r>
+          </a:p>
+          <a:p>
+            <a:r>
+              <a:rPr lang="en-US" dirty="0"/>
+              <a:t>Goal: Hands-on experience</a:t>
+            </a:r>
+          </a:p>
+          <a:p>
+            <a:r>
+              <a:rPr lang="en-US" dirty="0"/>
+              <a:t>Plan of Topics:</a:t>
             </a:r>
           </a:p>
           <a:p>
             <a:pPr lvl="1"/>
-            <a:endParaRPr lang="en-US" dirty="0"/>
-          </a:p>
-          <a:p>
-            <a:endParaRPr lang="en-US" dirty="0"/>
+            <a:r>
+              <a:rPr lang="en-US" dirty="0"/>
+              <a:t>Setting up an ML Pipeline</a:t>
+            </a:r>
+          </a:p>
+          <a:p>
+            <a:pPr lvl="1"/>
+            <a:r>
+              <a:rPr lang="en-US" dirty="0"/>
+              <a:t>Supervised Learning</a:t>
+            </a:r>
+            <a:br>
+              <a:rPr lang="en-US" dirty="0"/>
+            </a:br>
+            <a:r>
+              <a:rPr lang="en-US" dirty="0"/>
+              <a:t>(classification)</a:t>
+            </a:r>
+          </a:p>
+          <a:p>
+            <a:pPr lvl="1"/>
+            <a:r>
+              <a:rPr lang="en-US" dirty="0"/>
+              <a:t>Unsupervised Learning </a:t>
+            </a:r>
+            <a:br>
+              <a:rPr lang="en-US" dirty="0"/>
+            </a:br>
+            <a:r>
+              <a:rPr lang="en-US" dirty="0"/>
+              <a:t>(anomaly detection)</a:t>
+            </a:r>
+          </a:p>
+          <a:p>
+            <a:pPr lvl="1"/>
+            <a:r>
+              <a:rPr lang="en-US" dirty="0"/>
+              <a:t>Deployment Considerations</a:t>
+            </a:r>
           </a:p>
         </p:txBody>
       </p:sp>
     </p:spTree>
     <p:extLst>
       <p:ext uri="{BB962C8B-B14F-4D97-AF65-F5344CB8AC3E}">
-        <p14:creationId xmlns:p14="http://schemas.microsoft.com/office/powerpoint/2010/main" val="3420115950"/>
+        <p14:creationId xmlns:p14="http://schemas.microsoft.com/office/powerpoint/2010/main" val="623088304"/>
       </p:ext>
     </p:extLst>
   </p:cSld>
@@ -5812,7 +5734,7 @@
           <p:cNvPr id="2" name="Title 1">
             <a:extLst>
               <a:ext uri="{FF2B5EF4-FFF2-40B4-BE49-F238E27FC236}">
-                <a16:creationId xmlns:a16="http://schemas.microsoft.com/office/drawing/2014/main" id="{F3C541B5-22D2-5A42-B7B5-FDF3FC3C139A}"/>
+                <a16:creationId xmlns:a16="http://schemas.microsoft.com/office/drawing/2014/main" id="{90465F54-BC3D-5B4C-9659-7606C676D685}"/>
               </a:ext>
             </a:extLst>
           </p:cNvPr>
@@ -5830,7 +5752,7 @@
           <a:p>
             <a:r>
               <a:rPr lang="en-US" dirty="0"/>
-              <a:t>Assignments</a:t>
+              <a:t>Project</a:t>
             </a:r>
           </a:p>
         </p:txBody>
@@ -5840,7 +5762,7 @@
           <p:cNvPr id="3" name="Content Placeholder 2">
             <a:extLst>
               <a:ext uri="{FF2B5EF4-FFF2-40B4-BE49-F238E27FC236}">
-                <a16:creationId xmlns:a16="http://schemas.microsoft.com/office/drawing/2014/main" id="{DDB5F382-45E9-AB48-89C6-F2CE37D774F4}"/>
+                <a16:creationId xmlns:a16="http://schemas.microsoft.com/office/drawing/2014/main" id="{C5A1B6A2-0E8F-A14A-A109-7B65E6B7E815}"/>
               </a:ext>
             </a:extLst>
           </p:cNvPr>
@@ -5848,132 +5770,142 @@
             <a:spLocks noGrp="1"/>
           </p:cNvSpPr>
           <p:nvPr>
-            <p:ph sz="half" idx="1"/>
+            <p:ph idx="1"/>
           </p:nvPr>
         </p:nvSpPr>
         <p:spPr/>
         <p:txBody>
-          <a:bodyPr/>
+          <a:bodyPr>
+            <a:normAutofit fontScale="92500" lnSpcReduction="10000"/>
+          </a:bodyPr>
           <a:lstStyle/>
           <a:p>
-            <a:r>
-              <a:rPr lang="en-US" dirty="0"/>
-              <a:t>Out on Fridays, due on Fridays.</a:t>
-            </a:r>
-          </a:p>
-          <a:p>
+            <a:pPr marL="0" indent="0" algn="l">
+              <a:buNone/>
+            </a:pPr>
+            <a:r>
+              <a:rPr lang="en-US" b="1" i="0" dirty="0">
+                <a:solidFill>
+                  <a:srgbClr val="222222"/>
+                </a:solidFill>
+                <a:effectLst/>
+                <a:latin typeface="Noto Sans" panose="020B0604020202020204" pitchFamily="34" charset="0"/>
+              </a:rPr>
+              <a:t>Project.</a:t>
+            </a:r>
+            <a:r>
+              <a:rPr lang="en-US" b="0" i="0" dirty="0">
+                <a:solidFill>
+                  <a:srgbClr val="727272"/>
+                </a:solidFill>
+                <a:effectLst/>
+                <a:latin typeface="Noto Sans" panose="020B0604020202020204" pitchFamily="34" charset="0"/>
+              </a:rPr>
+              <a:t> The course will have a small project. You will have two options for completing the project.</a:t>
+            </a:r>
+          </a:p>
+          <a:p>
+            <a:pPr marL="0" indent="0" algn="l">
+              <a:buNone/>
+            </a:pPr>
+            <a:r>
+              <a:rPr lang="en-US" b="1" i="0" dirty="0">
+                <a:solidFill>
+                  <a:srgbClr val="222222"/>
+                </a:solidFill>
+                <a:effectLst/>
+                <a:latin typeface="Noto Sans" panose="020B0604020202020204" pitchFamily="34" charset="0"/>
+              </a:rPr>
+              <a:t>ML/Net Leaderboard.</a:t>
+            </a:r>
+            <a:r>
+              <a:rPr lang="en-US" b="0" i="0" dirty="0">
+                <a:solidFill>
+                  <a:srgbClr val="727272"/>
+                </a:solidFill>
+                <a:effectLst/>
+                <a:latin typeface="Noto Sans" panose="020B0604020202020204" pitchFamily="34" charset="0"/>
+              </a:rPr>
+              <a:t> </a:t>
+            </a:r>
+            <a:r>
+              <a:rPr lang="en-US" b="0" i="0" dirty="0" err="1">
+                <a:solidFill>
+                  <a:srgbClr val="727272"/>
+                </a:solidFill>
+                <a:effectLst/>
+                <a:latin typeface="Noto Sans" panose="020B0604020202020204" pitchFamily="34" charset="0"/>
+              </a:rPr>
+              <a:t>nPrint</a:t>
+            </a:r>
+            <a:r>
+              <a:rPr lang="en-US" b="0" i="0" dirty="0">
+                <a:solidFill>
+                  <a:srgbClr val="727272"/>
+                </a:solidFill>
+                <a:effectLst/>
+                <a:latin typeface="Noto Sans" panose="020B0604020202020204" pitchFamily="34" charset="0"/>
+              </a:rPr>
+              <a:t>/</a:t>
+            </a:r>
+            <a:r>
+              <a:rPr lang="en-US" b="0" i="0" dirty="0" err="1">
+                <a:solidFill>
+                  <a:srgbClr val="727272"/>
+                </a:solidFill>
+                <a:effectLst/>
+                <a:latin typeface="Noto Sans" panose="020B0604020202020204" pitchFamily="34" charset="0"/>
+              </a:rPr>
+              <a:t>pcapML</a:t>
+            </a:r>
+            <a:r>
+              <a:rPr lang="en-US" b="0" i="0" dirty="0">
+                <a:solidFill>
+                  <a:srgbClr val="727272"/>
+                </a:solidFill>
+                <a:effectLst/>
+                <a:latin typeface="Noto Sans" panose="020B0604020202020204" pitchFamily="34" charset="0"/>
+              </a:rPr>
+              <a:t>; your goal will be to re-produce or extend some of the best-known machine learning results for various applications of machine learning in computer networking.</a:t>
+            </a:r>
+          </a:p>
+          <a:p>
+            <a:pPr marL="0" indent="0" algn="l">
+              <a:buNone/>
+            </a:pPr>
+            <a:r>
+              <a:rPr lang="en-US" b="1" i="0" dirty="0">
+                <a:solidFill>
+                  <a:srgbClr val="222222"/>
+                </a:solidFill>
+                <a:effectLst/>
+                <a:latin typeface="Noto Sans" panose="020B0604020202020204" pitchFamily="34" charset="0"/>
+              </a:rPr>
+              <a:t>Research.</a:t>
+            </a:r>
+            <a:r>
+              <a:rPr lang="en-US" b="0" i="0" dirty="0">
+                <a:solidFill>
+                  <a:srgbClr val="727272"/>
+                </a:solidFill>
+                <a:effectLst/>
+                <a:latin typeface="Noto Sans" panose="020B0604020202020204" pitchFamily="34" charset="0"/>
+              </a:rPr>
+              <a:t> You are welcome to work on an independent research project that involves machine learning and computer systems. This option is probably better suited for graduate students in computer science who are comfortable working on open-ended problems. Your project must be approved by the instructor, based on a concrete research proposal.</a:t>
+            </a:r>
+          </a:p>
+          <a:p>
+            <a:pPr marL="0" indent="0">
+              <a:buNone/>
+            </a:pPr>
             <a:endParaRPr lang="en-US" dirty="0"/>
-          </a:p>
-          <a:p>
-            <a:r>
-              <a:rPr lang="en-US" dirty="0"/>
-              <a:t>Approximately every two weeks. </a:t>
-            </a:r>
-            <a:br>
-              <a:rPr lang="en-US" dirty="0"/>
-            </a:br>
-            <a:r>
-              <a:rPr lang="en-US" dirty="0"/>
-              <a:t>We will also have a warm-up assignment to test the workflow.</a:t>
-            </a:r>
-          </a:p>
-          <a:p>
-            <a:endParaRPr lang="en-US" dirty="0"/>
-          </a:p>
-          <a:p>
-            <a:r>
-              <a:rPr lang="en-US" dirty="0"/>
-              <a:t>Predictable cadence to help you plan.</a:t>
-            </a:r>
-          </a:p>
-        </p:txBody>
-      </p:sp>
-      <p:sp>
-        <p:nvSpPr>
-          <p:cNvPr id="4" name="Content Placeholder 3">
-            <a:extLst>
-              <a:ext uri="{FF2B5EF4-FFF2-40B4-BE49-F238E27FC236}">
-                <a16:creationId xmlns:a16="http://schemas.microsoft.com/office/drawing/2014/main" id="{32C5AB2B-5BF3-F54D-9029-203BD674A93C}"/>
-              </a:ext>
-            </a:extLst>
-          </p:cNvPr>
-          <p:cNvSpPr>
-            <a:spLocks noGrp="1"/>
-          </p:cNvSpPr>
-          <p:nvPr>
-            <p:ph sz="half" idx="2"/>
-          </p:nvPr>
-        </p:nvSpPr>
-        <p:spPr/>
-        <p:txBody>
-          <a:bodyPr/>
-          <a:lstStyle/>
-          <a:p>
-            <a:r>
-              <a:rPr lang="en-US" dirty="0"/>
-              <a:t>4–5 Assignments</a:t>
-            </a:r>
-          </a:p>
-          <a:p>
-            <a:r>
-              <a:rPr lang="en-US" dirty="0"/>
-              <a:t>Goal: Hands-on experience</a:t>
-            </a:r>
-          </a:p>
-          <a:p>
-            <a:r>
-              <a:rPr lang="en-US" dirty="0"/>
-              <a:t>Plan of Topics:</a:t>
-            </a:r>
-          </a:p>
-          <a:p>
-            <a:pPr lvl="1"/>
-            <a:r>
-              <a:rPr lang="en-US" dirty="0"/>
-              <a:t>Setting up an ML Pipeline</a:t>
-            </a:r>
-          </a:p>
-          <a:p>
-            <a:pPr lvl="1"/>
-            <a:r>
-              <a:rPr lang="en-US" dirty="0"/>
-              <a:t>Supervised Learning</a:t>
-            </a:r>
-            <a:br>
-              <a:rPr lang="en-US" dirty="0"/>
-            </a:br>
-            <a:r>
-              <a:rPr lang="en-US" dirty="0"/>
-              <a:t>(classification)</a:t>
-            </a:r>
-          </a:p>
-          <a:p>
-            <a:pPr lvl="1"/>
-            <a:r>
-              <a:rPr lang="en-US" dirty="0"/>
-              <a:t>Unsupervised Learning </a:t>
-            </a:r>
-            <a:br>
-              <a:rPr lang="en-US" dirty="0"/>
-            </a:br>
-            <a:r>
-              <a:rPr lang="en-US" dirty="0"/>
-              <a:t>(anomaly detection)</a:t>
-            </a:r>
-          </a:p>
-          <a:p>
-            <a:pPr lvl="1"/>
-            <a:r>
-              <a:rPr lang="en-US" dirty="0"/>
-              <a:t>Deployment Considerations</a:t>
-            </a:r>
           </a:p>
         </p:txBody>
       </p:sp>
     </p:spTree>
     <p:extLst>
       <p:ext uri="{BB962C8B-B14F-4D97-AF65-F5344CB8AC3E}">
-        <p14:creationId xmlns:p14="http://schemas.microsoft.com/office/powerpoint/2010/main" val="623088304"/>
+        <p14:creationId xmlns:p14="http://schemas.microsoft.com/office/powerpoint/2010/main" val="111063278"/>
       </p:ext>
     </p:extLst>
   </p:cSld>
@@ -6005,7 +5937,7 @@
           <p:cNvPr id="2" name="Title 1">
             <a:extLst>
               <a:ext uri="{FF2B5EF4-FFF2-40B4-BE49-F238E27FC236}">
-                <a16:creationId xmlns:a16="http://schemas.microsoft.com/office/drawing/2014/main" id="{90465F54-BC3D-5B4C-9659-7606C676D685}"/>
+                <a16:creationId xmlns:a16="http://schemas.microsoft.com/office/drawing/2014/main" id="{805BF63F-4838-D04A-A400-5A601DE2616E}"/>
               </a:ext>
             </a:extLst>
           </p:cNvPr>
@@ -6023,7 +5955,7 @@
           <a:p>
             <a:r>
               <a:rPr lang="en-US" dirty="0"/>
-              <a:t>Project</a:t>
+              <a:t>Late Policy</a:t>
             </a:r>
           </a:p>
         </p:txBody>
@@ -6033,7 +5965,7 @@
           <p:cNvPr id="3" name="Content Placeholder 2">
             <a:extLst>
               <a:ext uri="{FF2B5EF4-FFF2-40B4-BE49-F238E27FC236}">
-                <a16:creationId xmlns:a16="http://schemas.microsoft.com/office/drawing/2014/main" id="{C5A1B6A2-0E8F-A14A-A109-7B65E6B7E815}"/>
+                <a16:creationId xmlns:a16="http://schemas.microsoft.com/office/drawing/2014/main" id="{D115C061-3D31-8742-A0BA-1BBBC2AA1B9E}"/>
               </a:ext>
             </a:extLst>
           </p:cNvPr>
@@ -6046,137 +5978,57 @@
         </p:nvSpPr>
         <p:spPr/>
         <p:txBody>
-          <a:bodyPr>
-            <a:normAutofit fontScale="92500" lnSpcReduction="10000"/>
-          </a:bodyPr>
+          <a:bodyPr/>
           <a:lstStyle/>
           <a:p>
-            <a:pPr marL="0" indent="0" algn="l">
-              <a:buNone/>
-            </a:pPr>
-            <a:r>
-              <a:rPr lang="en-US" b="1" i="0" dirty="0">
-                <a:solidFill>
-                  <a:srgbClr val="222222"/>
-                </a:solidFill>
-                <a:effectLst/>
-                <a:latin typeface="Noto Sans" panose="020B0604020202020204" pitchFamily="34" charset="0"/>
-              </a:rPr>
-              <a:t>Project.</a:t>
-            </a:r>
-            <a:r>
-              <a:rPr lang="en-US" b="0" i="0" dirty="0">
-                <a:solidFill>
-                  <a:srgbClr val="727272"/>
-                </a:solidFill>
-                <a:effectLst/>
-                <a:latin typeface="Noto Sans" panose="020B0604020202020204" pitchFamily="34" charset="0"/>
-              </a:rPr>
-              <a:t> The course will have a small project. You will have two options for completing the project.</a:t>
-            </a:r>
-          </a:p>
-          <a:p>
-            <a:pPr marL="0" indent="0" algn="l">
-              <a:buNone/>
-            </a:pPr>
-            <a:r>
-              <a:rPr lang="en-US" b="1" i="0" dirty="0">
-                <a:solidFill>
-                  <a:srgbClr val="222222"/>
-                </a:solidFill>
-                <a:effectLst/>
-                <a:latin typeface="Noto Sans" panose="020B0604020202020204" pitchFamily="34" charset="0"/>
-              </a:rPr>
-              <a:t>ML/Net Leaderboard.</a:t>
-            </a:r>
-            <a:r>
-              <a:rPr lang="en-US" b="0" i="0" dirty="0">
-                <a:solidFill>
-                  <a:srgbClr val="727272"/>
-                </a:solidFill>
-                <a:effectLst/>
-                <a:latin typeface="Noto Sans" panose="020B0604020202020204" pitchFamily="34" charset="0"/>
-              </a:rPr>
-              <a:t> </a:t>
-            </a:r>
-            <a:r>
-              <a:rPr lang="en-US" b="0" i="0" dirty="0" err="1">
-                <a:solidFill>
-                  <a:srgbClr val="727272"/>
-                </a:solidFill>
-                <a:effectLst/>
-                <a:latin typeface="Noto Sans" panose="020B0604020202020204" pitchFamily="34" charset="0"/>
-              </a:rPr>
-              <a:t>nPrint</a:t>
-            </a:r>
-            <a:r>
-              <a:rPr lang="en-US" b="0" i="0" dirty="0">
-                <a:solidFill>
-                  <a:srgbClr val="727272"/>
-                </a:solidFill>
-                <a:effectLst/>
-                <a:latin typeface="Noto Sans" panose="020B0604020202020204" pitchFamily="34" charset="0"/>
-              </a:rPr>
-              <a:t>/</a:t>
-            </a:r>
-            <a:r>
-              <a:rPr lang="en-US" b="0" i="0" dirty="0" err="1">
-                <a:solidFill>
-                  <a:srgbClr val="727272"/>
-                </a:solidFill>
-                <a:effectLst/>
-                <a:latin typeface="Noto Sans" panose="020B0604020202020204" pitchFamily="34" charset="0"/>
-              </a:rPr>
-              <a:t>pcapML</a:t>
-            </a:r>
-            <a:r>
-              <a:rPr lang="en-US" b="0" i="0" dirty="0">
-                <a:solidFill>
-                  <a:srgbClr val="727272"/>
-                </a:solidFill>
-                <a:effectLst/>
-                <a:latin typeface="Noto Sans" panose="020B0604020202020204" pitchFamily="34" charset="0"/>
-              </a:rPr>
-              <a:t>; your goal will be to re-produce or extend some of the best-known machine learning results for various applications of machine learning in computer networking.</a:t>
-            </a:r>
-          </a:p>
-          <a:p>
-            <a:pPr marL="0" indent="0" algn="l">
-              <a:buNone/>
-            </a:pPr>
-            <a:r>
-              <a:rPr lang="en-US" b="1" i="0" dirty="0">
-                <a:solidFill>
-                  <a:srgbClr val="222222"/>
-                </a:solidFill>
-                <a:effectLst/>
-                <a:latin typeface="Noto Sans" panose="020B0604020202020204" pitchFamily="34" charset="0"/>
-              </a:rPr>
-              <a:t>Research.</a:t>
-            </a:r>
-            <a:r>
-              <a:rPr lang="en-US" b="0" i="0" dirty="0">
-                <a:solidFill>
-                  <a:srgbClr val="727272"/>
-                </a:solidFill>
-                <a:effectLst/>
-                <a:latin typeface="Noto Sans" panose="020B0604020202020204" pitchFamily="34" charset="0"/>
-              </a:rPr>
-              <a:t> You are welcome to work on an independent research project that involves machine learning and computer systems. This option is probably better suited for graduate students in computer science who are comfortable working on open-ended problems. Your project must be approved by the instructor, based on a concrete research proposal.</a:t>
-            </a:r>
-          </a:p>
-          <a:p>
-            <a:pPr marL="0" indent="0">
-              <a:buNone/>
-            </a:pPr>
+            <a:r>
+              <a:rPr lang="en-US" b="1" dirty="0"/>
+              <a:t>Don’t ask me or the course staff for extensions.</a:t>
+            </a:r>
+          </a:p>
+          <a:p>
+            <a:pPr lvl="1"/>
+            <a:r>
+              <a:rPr lang="en-US" dirty="0"/>
+              <a:t>It’s not fair to other students.</a:t>
+            </a:r>
+          </a:p>
+          <a:p>
+            <a:pPr lvl="1"/>
+            <a:r>
+              <a:rPr lang="en-US" dirty="0"/>
+              <a:t>It’s not fair to the instructional staff.</a:t>
+            </a:r>
+          </a:p>
+          <a:p>
+            <a:pPr lvl="1"/>
             <a:endParaRPr lang="en-US" dirty="0"/>
+          </a:p>
+          <a:p>
+            <a:pPr lvl="1"/>
+            <a:endParaRPr lang="en-US" dirty="0"/>
+          </a:p>
+          <a:p>
+            <a:r>
+              <a:rPr lang="en-US" dirty="0"/>
+              <a:t>You have late hours, read the syllabus.</a:t>
+            </a:r>
+          </a:p>
+          <a:p>
+            <a:endParaRPr lang="en-US" dirty="0"/>
+          </a:p>
+          <a:p>
+            <a:r>
+              <a:rPr lang="en-US" dirty="0"/>
+              <a:t>Occasionally, there are very extenuating circumstances that may take you out of the classroom for an extended period. We will work with you, let us know. But these are rare exceptions.</a:t>
+            </a:r>
           </a:p>
         </p:txBody>
       </p:sp>
     </p:spTree>
     <p:extLst>
       <p:ext uri="{BB962C8B-B14F-4D97-AF65-F5344CB8AC3E}">
-        <p14:creationId xmlns:p14="http://schemas.microsoft.com/office/powerpoint/2010/main" val="111063278"/>
+        <p14:creationId xmlns:p14="http://schemas.microsoft.com/office/powerpoint/2010/main" val="3583568818"/>
       </p:ext>
     </p:extLst>
   </p:cSld>
@@ -6208,7 +6060,7 @@
           <p:cNvPr id="2" name="Title 1">
             <a:extLst>
               <a:ext uri="{FF2B5EF4-FFF2-40B4-BE49-F238E27FC236}">
-                <a16:creationId xmlns:a16="http://schemas.microsoft.com/office/drawing/2014/main" id="{805BF63F-4838-D04A-A400-5A601DE2616E}"/>
+                <a16:creationId xmlns:a16="http://schemas.microsoft.com/office/drawing/2014/main" id="{B848BF39-FC52-0C44-87FC-F0EC348BCE03}"/>
               </a:ext>
             </a:extLst>
           </p:cNvPr>
@@ -6226,7 +6078,7 @@
           <a:p>
             <a:r>
               <a:rPr lang="en-US" dirty="0"/>
-              <a:t>Late Policy</a:t>
+              <a:t>Looking Ahead</a:t>
             </a:r>
           </a:p>
         </p:txBody>
@@ -6236,7 +6088,7 @@
           <p:cNvPr id="3" name="Content Placeholder 2">
             <a:extLst>
               <a:ext uri="{FF2B5EF4-FFF2-40B4-BE49-F238E27FC236}">
-                <a16:creationId xmlns:a16="http://schemas.microsoft.com/office/drawing/2014/main" id="{D115C061-3D31-8742-A0BA-1BBBC2AA1B9E}"/>
+                <a16:creationId xmlns:a16="http://schemas.microsoft.com/office/drawing/2014/main" id="{94CBBA2D-860A-7545-91D6-F5FA0739BAFC}"/>
               </a:ext>
             </a:extLst>
           </p:cNvPr>
@@ -6249,65 +6101,111 @@
         </p:nvSpPr>
         <p:spPr/>
         <p:txBody>
-          <a:bodyPr/>
+          <a:bodyPr>
+            <a:normAutofit fontScale="92500" lnSpcReduction="20000"/>
+          </a:bodyPr>
           <a:lstStyle/>
           <a:p>
             <a:r>
-              <a:rPr lang="en-US" b="1" dirty="0"/>
-              <a:t>Don’t ask me or the course staff for extensions.</a:t>
+              <a:rPr lang="en-US" dirty="0"/>
+              <a:t>Course setup:</a:t>
             </a:r>
           </a:p>
           <a:p>
             <a:pPr lvl="1"/>
             <a:r>
               <a:rPr lang="en-US" dirty="0"/>
-              <a:t>It’s not fair to other students.</a:t>
+              <a:t>Install </a:t>
+            </a:r>
+            <a:r>
+              <a:rPr lang="en-US" dirty="0" err="1"/>
+              <a:t>Jupyter</a:t>
+            </a:r>
+            <a:r>
+              <a:rPr lang="en-US" dirty="0"/>
+              <a:t> notebook (VS code, etc. could work well)</a:t>
             </a:r>
           </a:p>
           <a:p>
             <a:pPr lvl="1"/>
             <a:r>
               <a:rPr lang="en-US" dirty="0"/>
-              <a:t>It’s not fair to the instructional </a:t>
+              <a:t>Join course Slack, Canvas, </a:t>
             </a:r>
             <a:r>
               <a:rPr lang="en-US" dirty="0" err="1"/>
-              <a:t>staffl</a:t>
-            </a:r>
-            <a:r>
-              <a:rPr lang="en-US" dirty="0"/>
-              <a:t>.</a:t>
-            </a:r>
+              <a:t>Gradescope</a:t>
+            </a:r>
+            <a:endParaRPr lang="en-US" dirty="0"/>
           </a:p>
           <a:p>
             <a:pPr lvl="1"/>
             <a:endParaRPr lang="en-US" dirty="0"/>
           </a:p>
           <a:p>
+            <a:r>
+              <a:rPr lang="en-US" dirty="0"/>
+              <a:t>Do this in advance!</a:t>
+            </a:r>
+          </a:p>
+          <a:p>
+            <a:pPr lvl="1"/>
+            <a:r>
+              <a:rPr lang="en-US" dirty="0"/>
+              <a:t>We will check in on Slack to see how it’s going.</a:t>
+            </a:r>
+          </a:p>
+          <a:p>
             <a:pPr lvl="1"/>
             <a:endParaRPr lang="en-US" dirty="0"/>
           </a:p>
           <a:p>
             <a:r>
               <a:rPr lang="en-US" dirty="0"/>
-              <a:t>You have late hours, read the syllabus.</a:t>
-            </a:r>
-          </a:p>
-          <a:p>
+              <a:t>Hands-On</a:t>
+            </a:r>
+          </a:p>
+          <a:p>
+            <a:pPr lvl="1"/>
+            <a:r>
+              <a:rPr lang="en-US" dirty="0"/>
+              <a:t>Simple Python/</a:t>
+            </a:r>
+            <a:r>
+              <a:rPr lang="en-US" dirty="0" err="1"/>
+              <a:t>Jupyter</a:t>
+            </a:r>
+            <a:r>
+              <a:rPr lang="en-US" dirty="0"/>
+              <a:t> notebook</a:t>
+            </a:r>
+          </a:p>
+          <a:p>
+            <a:pPr lvl="1"/>
             <a:endParaRPr lang="en-US" dirty="0"/>
           </a:p>
           <a:p>
             <a:r>
               <a:rPr lang="en-US" dirty="0"/>
-              <a:t>Occasionally, there are very extenuating circumstances that may take you out of the classroom for an extended period. We will work with you, let us know. But these are rare exceptions.</a:t>
-            </a:r>
+              <a:t>Discussion (based on reading)</a:t>
+            </a:r>
+          </a:p>
+          <a:p>
+            <a:pPr lvl="1"/>
+            <a:r>
+              <a:rPr lang="en-US" dirty="0"/>
+              <a:t>What is machine learning, and how can it be used in systems?</a:t>
+            </a:r>
+          </a:p>
+          <a:p>
+            <a:endParaRPr lang="en-US" dirty="0"/>
           </a:p>
         </p:txBody>
       </p:sp>
     </p:spTree>
     <p:extLst>
       <p:ext uri="{BB962C8B-B14F-4D97-AF65-F5344CB8AC3E}">
-        <p14:creationId xmlns:p14="http://schemas.microsoft.com/office/powerpoint/2010/main" val="3583568818"/>
+        <p14:creationId xmlns:p14="http://schemas.microsoft.com/office/powerpoint/2010/main" val="3552459509"/>
       </p:ext>
     </p:extLst>
   </p:cSld>
@@ -6429,7 +6327,7 @@
                   <a:srgbClr val="C00000"/>
                 </a:solidFill>
               </a:rPr>
-              <a:t>To do for Thursday’s class:</a:t>
+              <a:t>To do for next class:</a:t>
             </a:r>
             <a:r>
               <a:rPr lang="en-US" dirty="0"/>
@@ -6450,184 +6348,6 @@
     <p:extLst>
       <p:ext uri="{BB962C8B-B14F-4D97-AF65-F5344CB8AC3E}">
         <p14:creationId xmlns:p14="http://schemas.microsoft.com/office/powerpoint/2010/main" val="1474411777"/>
-      </p:ext>
-    </p:extLst>
-  </p:cSld>
-  <p:clrMapOvr>
-    <a:masterClrMapping/>
-  </p:clrMapOvr>
-</p:sld>
-</file>
-
-<file path=ppt/slides/slide20.xml><?xml version="1.0" encoding="utf-8"?>
-<p:sld xmlns:a="http://schemas.openxmlformats.org/drawingml/2006/main" xmlns:r="http://schemas.openxmlformats.org/officeDocument/2006/relationships" xmlns:p="http://schemas.openxmlformats.org/presentationml/2006/main">
-  <p:cSld>
-    <p:spTree>
-      <p:nvGrpSpPr>
-        <p:cNvPr id="1" name=""/>
-        <p:cNvGrpSpPr/>
-        <p:nvPr/>
-      </p:nvGrpSpPr>
-      <p:grpSpPr>
-        <a:xfrm>
-          <a:off x="0" y="0"/>
-          <a:ext cx="0" cy="0"/>
-          <a:chOff x="0" y="0"/>
-          <a:chExt cx="0" cy="0"/>
-        </a:xfrm>
-      </p:grpSpPr>
-      <p:sp>
-        <p:nvSpPr>
-          <p:cNvPr id="2" name="Title 1">
-            <a:extLst>
-              <a:ext uri="{FF2B5EF4-FFF2-40B4-BE49-F238E27FC236}">
-                <a16:creationId xmlns:a16="http://schemas.microsoft.com/office/drawing/2014/main" id="{B848BF39-FC52-0C44-87FC-F0EC348BCE03}"/>
-              </a:ext>
-            </a:extLst>
-          </p:cNvPr>
-          <p:cNvSpPr>
-            <a:spLocks noGrp="1"/>
-          </p:cNvSpPr>
-          <p:nvPr>
-            <p:ph type="title"/>
-          </p:nvPr>
-        </p:nvSpPr>
-        <p:spPr/>
-        <p:txBody>
-          <a:bodyPr/>
-          <a:lstStyle/>
-          <a:p>
-            <a:r>
-              <a:rPr lang="en-US" dirty="0"/>
-              <a:t>Looking Ahead to Thursday</a:t>
-            </a:r>
-          </a:p>
-        </p:txBody>
-      </p:sp>
-      <p:sp>
-        <p:nvSpPr>
-          <p:cNvPr id="3" name="Content Placeholder 2">
-            <a:extLst>
-              <a:ext uri="{FF2B5EF4-FFF2-40B4-BE49-F238E27FC236}">
-                <a16:creationId xmlns:a16="http://schemas.microsoft.com/office/drawing/2014/main" id="{94CBBA2D-860A-7545-91D6-F5FA0739BAFC}"/>
-              </a:ext>
-            </a:extLst>
-          </p:cNvPr>
-          <p:cNvSpPr>
-            <a:spLocks noGrp="1"/>
-          </p:cNvSpPr>
-          <p:nvPr>
-            <p:ph idx="1"/>
-          </p:nvPr>
-        </p:nvSpPr>
-        <p:spPr/>
-        <p:txBody>
-          <a:bodyPr>
-            <a:normAutofit fontScale="92500" lnSpcReduction="20000"/>
-          </a:bodyPr>
-          <a:lstStyle/>
-          <a:p>
-            <a:r>
-              <a:rPr lang="en-US" dirty="0"/>
-              <a:t>Course setup:</a:t>
-            </a:r>
-          </a:p>
-          <a:p>
-            <a:pPr lvl="1"/>
-            <a:r>
-              <a:rPr lang="en-US" dirty="0"/>
-              <a:t>Install </a:t>
-            </a:r>
-            <a:r>
-              <a:rPr lang="en-US" dirty="0" err="1"/>
-              <a:t>Jupyter</a:t>
-            </a:r>
-            <a:r>
-              <a:rPr lang="en-US" dirty="0"/>
-              <a:t> notebooks</a:t>
-            </a:r>
-          </a:p>
-          <a:p>
-            <a:pPr lvl="1"/>
-            <a:r>
-              <a:rPr lang="en-US" dirty="0"/>
-              <a:t>Join course Slack, Canvas, </a:t>
-            </a:r>
-            <a:r>
-              <a:rPr lang="en-US" dirty="0" err="1"/>
-              <a:t>Gradescope</a:t>
-            </a:r>
-            <a:endParaRPr lang="en-US" dirty="0"/>
-          </a:p>
-          <a:p>
-            <a:pPr lvl="1"/>
-            <a:endParaRPr lang="en-US" dirty="0"/>
-          </a:p>
-          <a:p>
-            <a:r>
-              <a:rPr lang="en-US" dirty="0"/>
-              <a:t>Do this in advance!</a:t>
-            </a:r>
-          </a:p>
-          <a:p>
-            <a:pPr lvl="1"/>
-            <a:r>
-              <a:rPr lang="en-US" dirty="0"/>
-              <a:t>We will check in on Slack to see how it’s going.</a:t>
-            </a:r>
-          </a:p>
-          <a:p>
-            <a:pPr lvl="1"/>
-            <a:endParaRPr lang="en-US" dirty="0"/>
-          </a:p>
-          <a:p>
-            <a:r>
-              <a:rPr lang="en-US" dirty="0"/>
-              <a:t>Hands-On</a:t>
-            </a:r>
-          </a:p>
-          <a:p>
-            <a:pPr lvl="1"/>
-            <a:r>
-              <a:rPr lang="en-US" dirty="0"/>
-              <a:t>Simple Python/</a:t>
-            </a:r>
-            <a:r>
-              <a:rPr lang="en-US" dirty="0" err="1"/>
-              <a:t>Jupyter</a:t>
-            </a:r>
-            <a:r>
-              <a:rPr lang="en-US" dirty="0"/>
-              <a:t> notebook</a:t>
-            </a:r>
-          </a:p>
-          <a:p>
-            <a:pPr lvl="1"/>
-            <a:endParaRPr lang="en-US" dirty="0"/>
-          </a:p>
-          <a:p>
-            <a:r>
-              <a:rPr lang="en-US"/>
-              <a:t>Discussion (based on reading)</a:t>
-            </a:r>
-            <a:endParaRPr lang="en-US" dirty="0"/>
-          </a:p>
-          <a:p>
-            <a:pPr lvl="1"/>
-            <a:r>
-              <a:rPr lang="en-US" dirty="0"/>
-              <a:t>What is machine learning, and how can it be used in systems?</a:t>
-            </a:r>
-          </a:p>
-          <a:p>
-            <a:endParaRPr lang="en-US" dirty="0"/>
-          </a:p>
-        </p:txBody>
-      </p:sp>
-    </p:spTree>
-    <p:extLst>
-      <p:ext uri="{BB962C8B-B14F-4D97-AF65-F5344CB8AC3E}">
-        <p14:creationId xmlns:p14="http://schemas.microsoft.com/office/powerpoint/2010/main" val="3552459509"/>
       </p:ext>
     </p:extLst>
   </p:cSld>

</xml_diff>